<commit_message>
Improve presentation and documentation
</commit_message>
<xml_diff>
--- a/Documentation/Presentation.pptx
+++ b/Documentation/Presentation.pptx
@@ -3159,13 +3159,13 @@
   <p:clrMapOvr>
     <a:masterClrMapping/>
   </p:clrMapOvr>
-  <mc:AlternateContent xmlns:mc="http://schemas.openxmlformats.org/markup-compatibility/2006">
-    <mc:Choice xmlns:p14="http://schemas.microsoft.com/office/powerpoint/2010/main" Requires="p14">
+  <mc:AlternateContent xmlns:mc="http://schemas.openxmlformats.org/markup-compatibility/2006" xmlns:p14="http://schemas.microsoft.com/office/powerpoint/2010/main">
+    <mc:Choice Requires="p14">
       <p:transition spd="slow" p14:dur="1600">
         <p:blinds dir="vert"/>
       </p:transition>
     </mc:Choice>
-    <mc:Fallback>
+    <mc:Fallback xmlns="">
       <p:transition spd="slow">
         <p:blinds dir="vert"/>
       </p:transition>
@@ -3369,13 +3369,13 @@
   <p:clrMapOvr>
     <a:masterClrMapping/>
   </p:clrMapOvr>
-  <mc:AlternateContent xmlns:mc="http://schemas.openxmlformats.org/markup-compatibility/2006">
-    <mc:Choice xmlns:p14="http://schemas.microsoft.com/office/powerpoint/2010/main" Requires="p14">
+  <mc:AlternateContent xmlns:mc="http://schemas.openxmlformats.org/markup-compatibility/2006" xmlns:p14="http://schemas.microsoft.com/office/powerpoint/2010/main">
+    <mc:Choice Requires="p14">
       <p:transition spd="slow" p14:dur="1600">
         <p:blinds dir="vert"/>
       </p:transition>
     </mc:Choice>
-    <mc:Fallback>
+    <mc:Fallback xmlns="">
       <p:transition spd="slow">
         <p:blinds dir="vert"/>
       </p:transition>
@@ -3589,13 +3589,13 @@
   <p:clrMapOvr>
     <a:masterClrMapping/>
   </p:clrMapOvr>
-  <mc:AlternateContent xmlns:mc="http://schemas.openxmlformats.org/markup-compatibility/2006">
-    <mc:Choice xmlns:p14="http://schemas.microsoft.com/office/powerpoint/2010/main" Requires="p14">
+  <mc:AlternateContent xmlns:mc="http://schemas.openxmlformats.org/markup-compatibility/2006" xmlns:p14="http://schemas.microsoft.com/office/powerpoint/2010/main">
+    <mc:Choice Requires="p14">
       <p:transition spd="slow" p14:dur="1600">
         <p:blinds dir="vert"/>
       </p:transition>
     </mc:Choice>
-    <mc:Fallback>
+    <mc:Fallback xmlns="">
       <p:transition spd="slow">
         <p:blinds dir="vert"/>
       </p:transition>
@@ -3799,13 +3799,13 @@
   <p:clrMapOvr>
     <a:masterClrMapping/>
   </p:clrMapOvr>
-  <mc:AlternateContent xmlns:mc="http://schemas.openxmlformats.org/markup-compatibility/2006">
-    <mc:Choice xmlns:p14="http://schemas.microsoft.com/office/powerpoint/2010/main" Requires="p14">
+  <mc:AlternateContent xmlns:mc="http://schemas.openxmlformats.org/markup-compatibility/2006" xmlns:p14="http://schemas.microsoft.com/office/powerpoint/2010/main">
+    <mc:Choice Requires="p14">
       <p:transition spd="slow" p14:dur="1600">
         <p:blinds dir="vert"/>
       </p:transition>
     </mc:Choice>
-    <mc:Fallback>
+    <mc:Fallback xmlns="">
       <p:transition spd="slow">
         <p:blinds dir="vert"/>
       </p:transition>
@@ -4086,13 +4086,13 @@
   <p:clrMapOvr>
     <a:masterClrMapping/>
   </p:clrMapOvr>
-  <mc:AlternateContent xmlns:mc="http://schemas.openxmlformats.org/markup-compatibility/2006">
-    <mc:Choice xmlns:p14="http://schemas.microsoft.com/office/powerpoint/2010/main" Requires="p14">
+  <mc:AlternateContent xmlns:mc="http://schemas.openxmlformats.org/markup-compatibility/2006" xmlns:p14="http://schemas.microsoft.com/office/powerpoint/2010/main">
+    <mc:Choice Requires="p14">
       <p:transition spd="slow" p14:dur="1600">
         <p:blinds dir="vert"/>
       </p:transition>
     </mc:Choice>
-    <mc:Fallback>
+    <mc:Fallback xmlns="">
       <p:transition spd="slow">
         <p:blinds dir="vert"/>
       </p:transition>
@@ -4363,13 +4363,13 @@
   <p:clrMapOvr>
     <a:masterClrMapping/>
   </p:clrMapOvr>
-  <mc:AlternateContent xmlns:mc="http://schemas.openxmlformats.org/markup-compatibility/2006">
-    <mc:Choice xmlns:p14="http://schemas.microsoft.com/office/powerpoint/2010/main" Requires="p14">
+  <mc:AlternateContent xmlns:mc="http://schemas.openxmlformats.org/markup-compatibility/2006" xmlns:p14="http://schemas.microsoft.com/office/powerpoint/2010/main">
+    <mc:Choice Requires="p14">
       <p:transition spd="slow" p14:dur="1600">
         <p:blinds dir="vert"/>
       </p:transition>
     </mc:Choice>
-    <mc:Fallback>
+    <mc:Fallback xmlns="">
       <p:transition spd="slow">
         <p:blinds dir="vert"/>
       </p:transition>
@@ -4787,13 +4787,13 @@
   <p:clrMapOvr>
     <a:masterClrMapping/>
   </p:clrMapOvr>
-  <mc:AlternateContent xmlns:mc="http://schemas.openxmlformats.org/markup-compatibility/2006">
-    <mc:Choice xmlns:p14="http://schemas.microsoft.com/office/powerpoint/2010/main" Requires="p14">
+  <mc:AlternateContent xmlns:mc="http://schemas.openxmlformats.org/markup-compatibility/2006" xmlns:p14="http://schemas.microsoft.com/office/powerpoint/2010/main">
+    <mc:Choice Requires="p14">
       <p:transition spd="slow" p14:dur="1600">
         <p:blinds dir="vert"/>
       </p:transition>
     </mc:Choice>
-    <mc:Fallback>
+    <mc:Fallback xmlns="">
       <p:transition spd="slow">
         <p:blinds dir="vert"/>
       </p:transition>
@@ -4940,13 +4940,13 @@
   <p:clrMapOvr>
     <a:masterClrMapping/>
   </p:clrMapOvr>
-  <mc:AlternateContent xmlns:mc="http://schemas.openxmlformats.org/markup-compatibility/2006">
-    <mc:Choice xmlns:p14="http://schemas.microsoft.com/office/powerpoint/2010/main" Requires="p14">
+  <mc:AlternateContent xmlns:mc="http://schemas.openxmlformats.org/markup-compatibility/2006" xmlns:p14="http://schemas.microsoft.com/office/powerpoint/2010/main">
+    <mc:Choice Requires="p14">
       <p:transition spd="slow" p14:dur="1600">
         <p:blinds dir="vert"/>
       </p:transition>
     </mc:Choice>
-    <mc:Fallback>
+    <mc:Fallback xmlns="">
       <p:transition spd="slow">
         <p:blinds dir="vert"/>
       </p:transition>
@@ -5065,13 +5065,13 @@
   <p:clrMapOvr>
     <a:masterClrMapping/>
   </p:clrMapOvr>
-  <mc:AlternateContent xmlns:mc="http://schemas.openxmlformats.org/markup-compatibility/2006">
-    <mc:Choice xmlns:p14="http://schemas.microsoft.com/office/powerpoint/2010/main" Requires="p14">
+  <mc:AlternateContent xmlns:mc="http://schemas.openxmlformats.org/markup-compatibility/2006" xmlns:p14="http://schemas.microsoft.com/office/powerpoint/2010/main">
+    <mc:Choice Requires="p14">
       <p:transition spd="slow" p14:dur="1600">
         <p:blinds dir="vert"/>
       </p:transition>
     </mc:Choice>
-    <mc:Fallback>
+    <mc:Fallback xmlns="">
       <p:transition spd="slow">
         <p:blinds dir="vert"/>
       </p:transition>
@@ -5388,13 +5388,13 @@
   <p:clrMapOvr>
     <a:masterClrMapping/>
   </p:clrMapOvr>
-  <mc:AlternateContent xmlns:mc="http://schemas.openxmlformats.org/markup-compatibility/2006">
-    <mc:Choice xmlns:p14="http://schemas.microsoft.com/office/powerpoint/2010/main" Requires="p14">
+  <mc:AlternateContent xmlns:mc="http://schemas.openxmlformats.org/markup-compatibility/2006" xmlns:p14="http://schemas.microsoft.com/office/powerpoint/2010/main">
+    <mc:Choice Requires="p14">
       <p:transition spd="slow" p14:dur="1600">
         <p:blinds dir="vert"/>
       </p:transition>
     </mc:Choice>
-    <mc:Fallback>
+    <mc:Fallback xmlns="">
       <p:transition spd="slow">
         <p:blinds dir="vert"/>
       </p:transition>
@@ -5688,13 +5688,13 @@
   <p:clrMapOvr>
     <a:masterClrMapping/>
   </p:clrMapOvr>
-  <mc:AlternateContent xmlns:mc="http://schemas.openxmlformats.org/markup-compatibility/2006">
-    <mc:Choice xmlns:p14="http://schemas.microsoft.com/office/powerpoint/2010/main" Requires="p14">
+  <mc:AlternateContent xmlns:mc="http://schemas.openxmlformats.org/markup-compatibility/2006" xmlns:p14="http://schemas.microsoft.com/office/powerpoint/2010/main">
+    <mc:Choice Requires="p14">
       <p:transition spd="slow" p14:dur="1600">
         <p:blinds dir="vert"/>
       </p:transition>
     </mc:Choice>
-    <mc:Fallback>
+    <mc:Fallback xmlns="">
       <p:transition spd="slow">
         <p:blinds dir="vert"/>
       </p:transition>
@@ -5988,13 +5988,13 @@
     <p:sldLayoutId id="2147483694" r:id="rId10"/>
     <p:sldLayoutId id="2147483695" r:id="rId11"/>
   </p:sldLayoutIdLst>
-  <mc:AlternateContent xmlns:mc="http://schemas.openxmlformats.org/markup-compatibility/2006">
-    <mc:Choice xmlns:p14="http://schemas.microsoft.com/office/powerpoint/2010/main" Requires="p14">
+  <mc:AlternateContent xmlns:mc="http://schemas.openxmlformats.org/markup-compatibility/2006" xmlns:p14="http://schemas.microsoft.com/office/powerpoint/2010/main">
+    <mc:Choice Requires="p14">
       <p:transition spd="slow" p14:dur="1600">
         <p:blinds dir="vert"/>
       </p:transition>
     </mc:Choice>
-    <mc:Fallback>
+    <mc:Fallback xmlns="">
       <p:transition spd="slow">
         <p:blinds dir="vert"/>
       </p:transition>
@@ -6489,13 +6489,13 @@
   <p:clrMapOvr>
     <a:masterClrMapping/>
   </p:clrMapOvr>
-  <mc:AlternateContent xmlns:mc="http://schemas.openxmlformats.org/markup-compatibility/2006">
-    <mc:Choice xmlns:p14="http://schemas.microsoft.com/office/powerpoint/2010/main" Requires="p14">
+  <mc:AlternateContent xmlns:mc="http://schemas.openxmlformats.org/markup-compatibility/2006" xmlns:p14="http://schemas.microsoft.com/office/powerpoint/2010/main">
+    <mc:Choice Requires="p14">
       <p:transition spd="slow" p14:dur="1600">
         <p:blinds dir="vert"/>
       </p:transition>
     </mc:Choice>
-    <mc:Fallback>
+    <mc:Fallback xmlns="">
       <p:transition spd="slow">
         <p:blinds dir="vert"/>
       </p:transition>
@@ -6846,13 +6846,13 @@
   <p:clrMapOvr>
     <a:masterClrMapping/>
   </p:clrMapOvr>
-  <mc:AlternateContent xmlns:mc="http://schemas.openxmlformats.org/markup-compatibility/2006">
-    <mc:Choice xmlns:p14="http://schemas.microsoft.com/office/powerpoint/2010/main" Requires="p14">
+  <mc:AlternateContent xmlns:mc="http://schemas.openxmlformats.org/markup-compatibility/2006" xmlns:p14="http://schemas.microsoft.com/office/powerpoint/2010/main">
+    <mc:Choice Requires="p14">
       <p:transition spd="slow" p14:dur="1600">
         <p:blinds dir="vert"/>
       </p:transition>
     </mc:Choice>
-    <mc:Fallback>
+    <mc:Fallback xmlns="">
       <p:transition spd="slow">
         <p:blinds dir="vert"/>
       </p:transition>
@@ -7014,13 +7014,13 @@
   <p:clrMapOvr>
     <a:masterClrMapping/>
   </p:clrMapOvr>
-  <mc:AlternateContent xmlns:mc="http://schemas.openxmlformats.org/markup-compatibility/2006">
-    <mc:Choice xmlns:p14="http://schemas.microsoft.com/office/powerpoint/2010/main" Requires="p14">
+  <mc:AlternateContent xmlns:mc="http://schemas.openxmlformats.org/markup-compatibility/2006" xmlns:p14="http://schemas.microsoft.com/office/powerpoint/2010/main">
+    <mc:Choice Requires="p14">
       <p:transition spd="slow" p14:dur="1600">
         <p:blinds dir="vert"/>
       </p:transition>
     </mc:Choice>
-    <mc:Fallback>
+    <mc:Fallback xmlns="">
       <p:transition spd="slow">
         <p:blinds dir="vert"/>
       </p:transition>
@@ -7220,13 +7220,13 @@
   <p:clrMapOvr>
     <a:masterClrMapping/>
   </p:clrMapOvr>
-  <mc:AlternateContent xmlns:mc="http://schemas.openxmlformats.org/markup-compatibility/2006">
-    <mc:Choice xmlns:p14="http://schemas.microsoft.com/office/powerpoint/2010/main" Requires="p14">
+  <mc:AlternateContent xmlns:mc="http://schemas.openxmlformats.org/markup-compatibility/2006" xmlns:p14="http://schemas.microsoft.com/office/powerpoint/2010/main">
+    <mc:Choice Requires="p14">
       <p:transition spd="slow" p14:dur="1600">
         <p:blinds dir="vert"/>
       </p:transition>
     </mc:Choice>
-    <mc:Fallback>
+    <mc:Fallback xmlns="">
       <p:transition spd="slow">
         <p:blinds dir="vert"/>
       </p:transition>
@@ -7398,13 +7398,13 @@
   <p:clrMapOvr>
     <a:masterClrMapping/>
   </p:clrMapOvr>
-  <mc:AlternateContent xmlns:mc="http://schemas.openxmlformats.org/markup-compatibility/2006">
-    <mc:Choice xmlns:p14="http://schemas.microsoft.com/office/powerpoint/2010/main" Requires="p14">
+  <mc:AlternateContent xmlns:mc="http://schemas.openxmlformats.org/markup-compatibility/2006" xmlns:p14="http://schemas.microsoft.com/office/powerpoint/2010/main">
+    <mc:Choice Requires="p14">
       <p:transition spd="slow" p14:dur="1600">
         <p:blinds dir="vert"/>
       </p:transition>
     </mc:Choice>
-    <mc:Fallback>
+    <mc:Fallback xmlns="">
       <p:transition spd="slow">
         <p:blinds dir="vert"/>
       </p:transition>
@@ -7753,13 +7753,13 @@
   <p:clrMapOvr>
     <a:masterClrMapping/>
   </p:clrMapOvr>
-  <mc:AlternateContent xmlns:mc="http://schemas.openxmlformats.org/markup-compatibility/2006">
-    <mc:Choice xmlns:p14="http://schemas.microsoft.com/office/powerpoint/2010/main" Requires="p14">
+  <mc:AlternateContent xmlns:mc="http://schemas.openxmlformats.org/markup-compatibility/2006" xmlns:p14="http://schemas.microsoft.com/office/powerpoint/2010/main">
+    <mc:Choice Requires="p14">
       <p:transition spd="slow" p14:dur="1600">
         <p:blinds dir="vert"/>
       </p:transition>
     </mc:Choice>
-    <mc:Fallback>
+    <mc:Fallback xmlns="">
       <p:transition spd="slow">
         <p:blinds dir="vert"/>
       </p:transition>
@@ -7897,6 +7897,78 @@
           </a:p>
         </p:txBody>
       </p:sp>
+      <p:pic>
+        <p:nvPicPr>
+          <p:cNvPr id="5" name="Picture 4">
+            <a:extLst>
+              <a:ext uri="{FF2B5EF4-FFF2-40B4-BE49-F238E27FC236}">
+                <a16:creationId xmlns:a16="http://schemas.microsoft.com/office/drawing/2014/main" id="{3EC3E0BA-5AD9-23D4-ECFB-0A45C71A8042}"/>
+              </a:ext>
+            </a:extLst>
+          </p:cNvPr>
+          <p:cNvPicPr>
+            <a:picLocks noChangeAspect="1"/>
+          </p:cNvPicPr>
+          <p:nvPr/>
+        </p:nvPicPr>
+        <p:blipFill>
+          <a:blip r:embed="rId4">
+            <a:extLst>
+              <a:ext uri="{28A0092B-C50C-407E-A947-70E740481C1C}">
+                <a14:useLocalDpi xmlns:a14="http://schemas.microsoft.com/office/drawing/2010/main" val="0"/>
+              </a:ext>
+            </a:extLst>
+          </a:blip>
+          <a:stretch>
+            <a:fillRect/>
+          </a:stretch>
+        </p:blipFill>
+        <p:spPr>
+          <a:xfrm>
+            <a:off x="9353139" y="2238375"/>
+            <a:ext cx="2381250" cy="2381250"/>
+          </a:xfrm>
+          <a:prstGeom prst="rect">
+            <a:avLst/>
+          </a:prstGeom>
+        </p:spPr>
+      </p:pic>
+      <p:pic>
+        <p:nvPicPr>
+          <p:cNvPr id="6" name="Picture 5">
+            <a:extLst>
+              <a:ext uri="{FF2B5EF4-FFF2-40B4-BE49-F238E27FC236}">
+                <a16:creationId xmlns:a16="http://schemas.microsoft.com/office/drawing/2014/main" id="{C68682AE-B5A6-EF02-2994-B917D57416FF}"/>
+              </a:ext>
+            </a:extLst>
+          </p:cNvPr>
+          <p:cNvPicPr>
+            <a:picLocks noChangeAspect="1"/>
+          </p:cNvPicPr>
+          <p:nvPr/>
+        </p:nvPicPr>
+        <p:blipFill>
+          <a:blip r:embed="rId4">
+            <a:extLst>
+              <a:ext uri="{28A0092B-C50C-407E-A947-70E740481C1C}">
+                <a14:useLocalDpi xmlns:a14="http://schemas.microsoft.com/office/drawing/2010/main" val="0"/>
+              </a:ext>
+            </a:extLst>
+          </a:blip>
+          <a:stretch>
+            <a:fillRect/>
+          </a:stretch>
+        </p:blipFill>
+        <p:spPr>
+          <a:xfrm flipH="1">
+            <a:off x="447870" y="2238375"/>
+            <a:ext cx="2381250" cy="2381250"/>
+          </a:xfrm>
+          <a:prstGeom prst="rect">
+            <a:avLst/>
+          </a:prstGeom>
+        </p:spPr>
+      </p:pic>
     </p:spTree>
     <p:extLst>
       <p:ext uri="{BB962C8B-B14F-4D97-AF65-F5344CB8AC3E}">
@@ -7907,13 +7979,13 @@
   <p:clrMapOvr>
     <a:masterClrMapping/>
   </p:clrMapOvr>
-  <mc:AlternateContent xmlns:mc="http://schemas.openxmlformats.org/markup-compatibility/2006">
-    <mc:Choice xmlns:p14="http://schemas.microsoft.com/office/powerpoint/2010/main" Requires="p14">
+  <mc:AlternateContent xmlns:mc="http://schemas.openxmlformats.org/markup-compatibility/2006" xmlns:p14="http://schemas.microsoft.com/office/powerpoint/2010/main">
+    <mc:Choice Requires="p14">
       <p:transition spd="slow" p14:dur="1600">
         <p:blinds dir="vert"/>
       </p:transition>
     </mc:Choice>
-    <mc:Fallback>
+    <mc:Fallback xmlns="">
       <p:transition spd="slow">
         <p:blinds dir="vert"/>
       </p:transition>

</xml_diff>